<commit_message>
added a folder for documentation
</commit_message>
<xml_diff>
--- a/Presentation/Presentation1.pptx
+++ b/Presentation/Presentation1.pptx
@@ -194,7 +194,7 @@
           <a:p>
             <a:fld id="{BE889A0B-E11B-4686-9B50-26B1AE458E77}" type="datetimeFigureOut">
               <a:rPr lang="en-US" smtClean="0"/>
-              <a:t>4/8/2021</a:t>
+              <a:t>4/18/2021</a:t>
             </a:fld>
             <a:endParaRPr lang="en-US"/>
           </a:p>
@@ -643,7 +643,7 @@
           <a:p>
             <a:fld id="{E98D3FE2-B97E-466F-A7EF-251D1C4B858A}" type="datetimeFigureOut">
               <a:rPr lang="en-US" smtClean="0"/>
-              <a:t>4/8/2021</a:t>
+              <a:t>4/18/2021</a:t>
             </a:fld>
             <a:endParaRPr lang="en-US"/>
           </a:p>
@@ -813,7 +813,7 @@
           <a:p>
             <a:fld id="{E98D3FE2-B97E-466F-A7EF-251D1C4B858A}" type="datetimeFigureOut">
               <a:rPr lang="en-US" smtClean="0"/>
-              <a:t>4/8/2021</a:t>
+              <a:t>4/18/2021</a:t>
             </a:fld>
             <a:endParaRPr lang="en-US"/>
           </a:p>
@@ -993,7 +993,7 @@
           <a:p>
             <a:fld id="{E98D3FE2-B97E-466F-A7EF-251D1C4B858A}" type="datetimeFigureOut">
               <a:rPr lang="en-US" smtClean="0"/>
-              <a:t>4/8/2021</a:t>
+              <a:t>4/18/2021</a:t>
             </a:fld>
             <a:endParaRPr lang="en-US"/>
           </a:p>
@@ -1163,7 +1163,7 @@
           <a:p>
             <a:fld id="{E98D3FE2-B97E-466F-A7EF-251D1C4B858A}" type="datetimeFigureOut">
               <a:rPr lang="en-US" smtClean="0"/>
-              <a:t>4/8/2021</a:t>
+              <a:t>4/18/2021</a:t>
             </a:fld>
             <a:endParaRPr lang="en-US"/>
           </a:p>
@@ -1409,7 +1409,7 @@
           <a:p>
             <a:fld id="{E98D3FE2-B97E-466F-A7EF-251D1C4B858A}" type="datetimeFigureOut">
               <a:rPr lang="en-US" smtClean="0"/>
-              <a:t>4/8/2021</a:t>
+              <a:t>4/18/2021</a:t>
             </a:fld>
             <a:endParaRPr lang="en-US"/>
           </a:p>
@@ -1697,7 +1697,7 @@
           <a:p>
             <a:fld id="{E98D3FE2-B97E-466F-A7EF-251D1C4B858A}" type="datetimeFigureOut">
               <a:rPr lang="en-US" smtClean="0"/>
-              <a:t>4/8/2021</a:t>
+              <a:t>4/18/2021</a:t>
             </a:fld>
             <a:endParaRPr lang="en-US"/>
           </a:p>
@@ -2119,7 +2119,7 @@
           <a:p>
             <a:fld id="{E98D3FE2-B97E-466F-A7EF-251D1C4B858A}" type="datetimeFigureOut">
               <a:rPr lang="en-US" smtClean="0"/>
-              <a:t>4/8/2021</a:t>
+              <a:t>4/18/2021</a:t>
             </a:fld>
             <a:endParaRPr lang="en-US"/>
           </a:p>
@@ -2237,7 +2237,7 @@
           <a:p>
             <a:fld id="{E98D3FE2-B97E-466F-A7EF-251D1C4B858A}" type="datetimeFigureOut">
               <a:rPr lang="en-US" smtClean="0"/>
-              <a:t>4/8/2021</a:t>
+              <a:t>4/18/2021</a:t>
             </a:fld>
             <a:endParaRPr lang="en-US"/>
           </a:p>
@@ -2332,7 +2332,7 @@
           <a:p>
             <a:fld id="{E98D3FE2-B97E-466F-A7EF-251D1C4B858A}" type="datetimeFigureOut">
               <a:rPr lang="en-US" smtClean="0"/>
-              <a:t>4/8/2021</a:t>
+              <a:t>4/18/2021</a:t>
             </a:fld>
             <a:endParaRPr lang="en-US"/>
           </a:p>
@@ -2609,7 +2609,7 @@
           <a:p>
             <a:fld id="{E98D3FE2-B97E-466F-A7EF-251D1C4B858A}" type="datetimeFigureOut">
               <a:rPr lang="en-US" smtClean="0"/>
-              <a:t>4/8/2021</a:t>
+              <a:t>4/18/2021</a:t>
             </a:fld>
             <a:endParaRPr lang="en-US"/>
           </a:p>
@@ -2862,7 +2862,7 @@
           <a:p>
             <a:fld id="{E98D3FE2-B97E-466F-A7EF-251D1C4B858A}" type="datetimeFigureOut">
               <a:rPr lang="en-US" smtClean="0"/>
-              <a:t>4/8/2021</a:t>
+              <a:t>4/18/2021</a:t>
             </a:fld>
             <a:endParaRPr lang="en-US"/>
           </a:p>
@@ -3075,7 +3075,7 @@
           <a:p>
             <a:fld id="{E98D3FE2-B97E-466F-A7EF-251D1C4B858A}" type="datetimeFigureOut">
               <a:rPr lang="en-US" smtClean="0"/>
-              <a:t>4/8/2021</a:t>
+              <a:t>4/18/2021</a:t>
             </a:fld>
             <a:endParaRPr lang="en-US"/>
           </a:p>
@@ -3450,9 +3450,39 @@
           <a:chExt cx="0" cy="0"/>
         </a:xfrm>
       </p:grpSpPr>
+      <p:sp>
+        <p:nvSpPr>
+          <p:cNvPr id="11" name="TextBox 10"/>
+          <p:cNvSpPr txBox="1"/>
+          <p:nvPr/>
+        </p:nvSpPr>
+        <p:spPr>
+          <a:xfrm>
+            <a:off x="816232" y="627965"/>
+            <a:ext cx="7663935" cy="646331"/>
+          </a:xfrm>
+          <a:prstGeom prst="rect">
+            <a:avLst/>
+          </a:prstGeom>
+          <a:noFill/>
+        </p:spPr>
+        <p:txBody>
+          <a:bodyPr wrap="square" rtlCol="0">
+            <a:spAutoFit/>
+          </a:bodyPr>
+          <a:lstStyle/>
+          <a:p>
+            <a:r>
+              <a:rPr lang="en-US" dirty="0" smtClean="0"/>
+              <a:t>A salesperson from a company needs to introduce the company to the customer and gather the query. The sales process follows as per the following diagram:-</a:t>
+            </a:r>
+            <a:endParaRPr lang="en-US" dirty="0"/>
+          </a:p>
+        </p:txBody>
+      </p:sp>
       <p:pic>
         <p:nvPicPr>
-          <p:cNvPr id="2" name="Picture 1"/>
+          <p:cNvPr id="31" name="Picture 30"/>
           <p:cNvPicPr>
             <a:picLocks noChangeAspect="1"/>
           </p:cNvPicPr>
@@ -3472,8 +3502,8 @@
         </p:blipFill>
         <p:spPr>
           <a:xfrm>
-            <a:off x="381000" y="1667528"/>
-            <a:ext cx="8308777" cy="4500588"/>
+            <a:off x="553468" y="1969294"/>
+            <a:ext cx="8090517" cy="4113785"/>
           </a:xfrm>
           <a:prstGeom prst="rect">
             <a:avLst/>
@@ -3482,14 +3512,14 @@
       </p:pic>
       <p:sp>
         <p:nvSpPr>
-          <p:cNvPr id="3" name="TextBox 2"/>
+          <p:cNvPr id="32" name="TextBox 31"/>
           <p:cNvSpPr txBox="1"/>
           <p:nvPr/>
         </p:nvSpPr>
         <p:spPr>
           <a:xfrm rot="5400000">
-            <a:off x="7770912" y="3732312"/>
-            <a:ext cx="1066799" cy="307777"/>
+            <a:off x="6389053" y="3947676"/>
+            <a:ext cx="940871" cy="307777"/>
           </a:xfrm>
           <a:prstGeom prst="rect">
             <a:avLst/>
@@ -3504,7 +3534,7 @@
           <a:p>
             <a:r>
               <a:rPr lang="en-US" sz="1400" b="1" dirty="0" smtClean="0"/>
-              <a:t>Quotation</a:t>
+              <a:t>Payment</a:t>
             </a:r>
             <a:endParaRPr lang="en-US" sz="1400" b="1" dirty="0"/>
           </a:p>
@@ -3512,14 +3542,14 @@
       </p:sp>
       <p:sp>
         <p:nvSpPr>
-          <p:cNvPr id="4" name="TextBox 3"/>
+          <p:cNvPr id="33" name="TextBox 32"/>
           <p:cNvSpPr txBox="1"/>
           <p:nvPr/>
         </p:nvSpPr>
         <p:spPr>
-          <a:xfrm>
-            <a:off x="5608318" y="1686580"/>
-            <a:ext cx="2822377" cy="523220"/>
+          <a:xfrm rot="5400000">
+            <a:off x="6651124" y="3821875"/>
+            <a:ext cx="1550727" cy="307777"/>
           </a:xfrm>
           <a:prstGeom prst="rect">
             <a:avLst/>
@@ -3534,15 +3564,7 @@
           <a:p>
             <a:r>
               <a:rPr lang="en-US" sz="1400" dirty="0" smtClean="0"/>
-              <a:t>(</a:t>
-            </a:r>
-            <a:r>
-              <a:rPr lang="en-US" sz="1400" u="sng" dirty="0" smtClean="0"/>
-              <a:t>Product dealing done</a:t>
-            </a:r>
-            <a:r>
-              <a:rPr lang="en-US" sz="1400" dirty="0" smtClean="0"/>
-              <a:t>: After negotiation the price )</a:t>
+              <a:t>(Finalize the deal)</a:t>
             </a:r>
             <a:endParaRPr lang="en-US" sz="1400" dirty="0"/>
           </a:p>
@@ -3550,14 +3572,14 @@
       </p:sp>
       <p:sp>
         <p:nvSpPr>
-          <p:cNvPr id="5" name="TextBox 4"/>
+          <p:cNvPr id="34" name="TextBox 33"/>
           <p:cNvSpPr txBox="1"/>
           <p:nvPr/>
         </p:nvSpPr>
         <p:spPr>
-          <a:xfrm>
-            <a:off x="6324600" y="2262948"/>
-            <a:ext cx="609600" cy="307777"/>
+          <a:xfrm rot="5400000">
+            <a:off x="7354789" y="3922812"/>
+            <a:ext cx="1295400" cy="307777"/>
           </a:xfrm>
           <a:prstGeom prst="rect">
             <a:avLst/>
@@ -3572,7 +3594,7 @@
           <a:p>
             <a:r>
               <a:rPr lang="en-US" sz="1400" b="1" dirty="0" smtClean="0"/>
-              <a:t>PO</a:t>
+              <a:t>Quotation</a:t>
             </a:r>
             <a:endParaRPr lang="en-US" sz="1400" b="1" dirty="0"/>
           </a:p>
@@ -3580,14 +3602,14 @@
       </p:sp>
       <p:sp>
         <p:nvSpPr>
-          <p:cNvPr id="6" name="TextBox 5"/>
+          <p:cNvPr id="35" name="TextBox 34"/>
           <p:cNvSpPr txBox="1"/>
           <p:nvPr/>
         </p:nvSpPr>
         <p:spPr>
-          <a:xfrm rot="5400000">
-            <a:off x="6865513" y="3808511"/>
-            <a:ext cx="1676400" cy="307777"/>
+          <a:xfrm>
+            <a:off x="5257800" y="1943605"/>
+            <a:ext cx="2667000" cy="523220"/>
           </a:xfrm>
           <a:prstGeom prst="rect">
             <a:avLst/>
@@ -3601,8 +3623,16 @@
           <a:lstStyle/>
           <a:p>
             <a:r>
-              <a:rPr lang="en-US" sz="1400" dirty="0" smtClean="0"/>
-              <a:t>(Finalize the deal)</a:t>
+              <a:rPr lang="en-US" sz="1400" dirty="0"/>
+              <a:t>(</a:t>
+            </a:r>
+            <a:r>
+              <a:rPr lang="en-US" sz="1400" u="sng" dirty="0"/>
+              <a:t>Product dealing done</a:t>
+            </a:r>
+            <a:r>
+              <a:rPr lang="en-US" sz="1400" dirty="0"/>
+              <a:t>: After negotiation the price )</a:t>
             </a:r>
             <a:endParaRPr lang="en-US" sz="1400" dirty="0"/>
           </a:p>
@@ -3610,14 +3640,14 @@
       </p:sp>
       <p:sp>
         <p:nvSpPr>
-          <p:cNvPr id="7" name="TextBox 6"/>
+          <p:cNvPr id="36" name="TextBox 35"/>
           <p:cNvSpPr txBox="1"/>
           <p:nvPr/>
         </p:nvSpPr>
         <p:spPr>
-          <a:xfrm rot="16200000">
-            <a:off x="860429" y="3539096"/>
-            <a:ext cx="1086874" cy="369332"/>
+          <a:xfrm>
+            <a:off x="5943600" y="2514600"/>
+            <a:ext cx="1371600" cy="307777"/>
           </a:xfrm>
           <a:prstGeom prst="rect">
             <a:avLst/>
@@ -3631,23 +3661,23 @@
           <a:lstStyle/>
           <a:p>
             <a:r>
-              <a:rPr lang="en-US" b="1" dirty="0" smtClean="0"/>
-              <a:t>Invoice</a:t>
-            </a:r>
-            <a:endParaRPr lang="en-US" b="1" dirty="0"/>
-          </a:p>
-        </p:txBody>
-      </p:sp>
-      <p:sp>
-        <p:nvSpPr>
-          <p:cNvPr id="8" name="TextBox 7"/>
+              <a:rPr lang="en-US" sz="1400" b="1" dirty="0" smtClean="0"/>
+              <a:t>PO</a:t>
+            </a:r>
+            <a:endParaRPr lang="en-US" sz="1400" b="1" dirty="0"/>
+          </a:p>
+        </p:txBody>
+      </p:sp>
+      <p:sp>
+        <p:nvSpPr>
+          <p:cNvPr id="37" name="TextBox 36"/>
           <p:cNvSpPr txBox="1"/>
           <p:nvPr/>
         </p:nvSpPr>
         <p:spPr>
           <a:xfrm>
-            <a:off x="1622060" y="2209800"/>
-            <a:ext cx="2416540" cy="307777"/>
+            <a:off x="1549209" y="2299157"/>
+            <a:ext cx="1828800" cy="523220"/>
           </a:xfrm>
           <a:prstGeom prst="rect">
             <a:avLst/>
@@ -3661,7 +3691,7 @@
           <a:lstStyle/>
           <a:p>
             <a:r>
-              <a:rPr lang="en-US" sz="1400" dirty="0" smtClean="0"/>
+              <a:rPr lang="en-US" sz="1400" dirty="0"/>
               <a:t>(Company raises  own PO)</a:t>
             </a:r>
             <a:endParaRPr lang="en-US" sz="1400" dirty="0"/>
@@ -3670,14 +3700,14 @@
       </p:sp>
       <p:sp>
         <p:nvSpPr>
-          <p:cNvPr id="9" name="TextBox 8"/>
+          <p:cNvPr id="38" name="TextBox 37"/>
           <p:cNvSpPr txBox="1"/>
           <p:nvPr/>
         </p:nvSpPr>
         <p:spPr>
-          <a:xfrm>
-            <a:off x="3688082" y="5376446"/>
-            <a:ext cx="2331718" cy="338554"/>
+          <a:xfrm rot="16200000">
+            <a:off x="1244890" y="3555712"/>
+            <a:ext cx="838198" cy="584775"/>
           </a:xfrm>
           <a:prstGeom prst="rect">
             <a:avLst/>
@@ -3691,23 +3721,25 @@
           <a:lstStyle/>
           <a:p>
             <a:r>
-              <a:rPr lang="en-US" sz="1600" b="1" dirty="0" smtClean="0"/>
-              <a:t>Supply the products</a:t>
-            </a:r>
-            <a:endParaRPr lang="en-US" sz="1600" b="1" dirty="0"/>
-          </a:p>
-        </p:txBody>
-      </p:sp>
-      <p:sp>
-        <p:nvSpPr>
-          <p:cNvPr id="10" name="TextBox 9"/>
+              <a:rPr lang="en-US" sz="1400" b="1" dirty="0"/>
+              <a:t>Invoice</a:t>
+            </a:r>
+          </a:p>
+          <a:p>
+            <a:endParaRPr lang="en-US" dirty="0"/>
+          </a:p>
+        </p:txBody>
+      </p:sp>
+      <p:sp>
+        <p:nvSpPr>
+          <p:cNvPr id="39" name="TextBox 38"/>
           <p:cNvSpPr txBox="1"/>
           <p:nvPr/>
         </p:nvSpPr>
         <p:spPr>
-          <a:xfrm rot="5400000">
-            <a:off x="6592788" y="3846611"/>
-            <a:ext cx="1143001" cy="307777"/>
+          <a:xfrm rot="16200000">
+            <a:off x="3441412" y="3974812"/>
+            <a:ext cx="1828800" cy="584775"/>
           </a:xfrm>
           <a:prstGeom prst="rect">
             <a:avLst/>
@@ -3721,23 +3753,25 @@
           <a:lstStyle/>
           <a:p>
             <a:r>
-              <a:rPr lang="en-US" sz="1400" b="1" dirty="0" smtClean="0"/>
-              <a:t>Payment</a:t>
-            </a:r>
-            <a:endParaRPr lang="en-US" sz="1400" b="1" dirty="0"/>
-          </a:p>
-        </p:txBody>
-      </p:sp>
-      <p:sp>
-        <p:nvSpPr>
-          <p:cNvPr id="11" name="TextBox 10"/>
+              <a:rPr lang="en-US" sz="1400" b="1" dirty="0"/>
+              <a:t>Supply the products</a:t>
+            </a:r>
+          </a:p>
+          <a:p>
+            <a:endParaRPr lang="en-US" dirty="0"/>
+          </a:p>
+        </p:txBody>
+      </p:sp>
+      <p:sp>
+        <p:nvSpPr>
+          <p:cNvPr id="40" name="TextBox 39"/>
           <p:cNvSpPr txBox="1"/>
           <p:nvPr/>
         </p:nvSpPr>
         <p:spPr>
-          <a:xfrm>
-            <a:off x="766760" y="304800"/>
-            <a:ext cx="7663935" cy="646331"/>
+          <a:xfrm rot="5400000">
+            <a:off x="3721388" y="4051012"/>
+            <a:ext cx="1676400" cy="584775"/>
           </a:xfrm>
           <a:prstGeom prst="rect">
             <a:avLst/>
@@ -3751,9 +3785,43 @@
           <a:lstStyle/>
           <a:p>
             <a:r>
-              <a:rPr lang="en-US" dirty="0" smtClean="0"/>
-              <a:t>A salesperson from a company needs to introduce the company to the customer and gather the query. The sales process follows as per the following diagram:-</a:t>
-            </a:r>
+              <a:rPr lang="en-US" sz="1400" b="1" dirty="0"/>
+              <a:t>Supply the products</a:t>
+            </a:r>
+          </a:p>
+          <a:p>
+            <a:endParaRPr lang="en-US" dirty="0"/>
+          </a:p>
+        </p:txBody>
+      </p:sp>
+      <p:sp>
+        <p:nvSpPr>
+          <p:cNvPr id="41" name="TextBox 40"/>
+          <p:cNvSpPr txBox="1"/>
+          <p:nvPr/>
+        </p:nvSpPr>
+        <p:spPr>
+          <a:xfrm>
+            <a:off x="3618801" y="5410200"/>
+            <a:ext cx="1791399" cy="584775"/>
+          </a:xfrm>
+          <a:prstGeom prst="rect">
+            <a:avLst/>
+          </a:prstGeom>
+          <a:noFill/>
+        </p:spPr>
+        <p:txBody>
+          <a:bodyPr wrap="square" rtlCol="0">
+            <a:spAutoFit/>
+          </a:bodyPr>
+          <a:lstStyle/>
+          <a:p>
+            <a:r>
+              <a:rPr lang="en-US" sz="1400" b="1" dirty="0"/>
+              <a:t>Supply the products</a:t>
+            </a:r>
+          </a:p>
+          <a:p>
             <a:endParaRPr lang="en-US" dirty="0"/>
           </a:p>
         </p:txBody>

</xml_diff>